<commit_message>
new version of the model
</commit_message>
<xml_diff>
--- a/Various materials/Cycle_dechets.pptx
+++ b/Various materials/Cycle_dechets.pptx
@@ -104,6 +104,11 @@
       </a:defRPr>
     </a:lvl9pPr>
   </p:defaultTextStyle>
+  <p:extLst>
+    <p:ext uri="{EFAFB233-063F-42B5-8137-9DF3F51BA10A}">
+      <p15:sldGuideLst xmlns:p15="http://schemas.microsoft.com/office/powerpoint/2012/main"/>
+    </p:ext>
+  </p:extLst>
 </p:presentation>
 </file>
 
@@ -3822,7 +3827,7 @@
         <p:spPr>
           <a:xfrm>
             <a:off x="3517758" y="1874804"/>
-            <a:ext cx="1532414" cy="215444"/>
+            <a:ext cx="1532414" cy="584775"/>
           </a:xfrm>
           <a:prstGeom prst="rect">
             <a:avLst/>
@@ -3848,10 +3853,28 @@
               <a:t> / 80 % </a:t>
             </a:r>
             <a:r>
-              <a:rPr lang="fr-FR" sz="800" b="1" dirty="0" err="1"/>
+              <a:rPr lang="fr-FR" sz="800" b="1" dirty="0" err="1" smtClean="0"/>
               <a:t>unfiltered</a:t>
             </a:r>
-            <a:endParaRPr lang="fr-FR" sz="800" dirty="0"/>
+            <a:endParaRPr lang="fr-FR" sz="800" b="1" dirty="0" smtClean="0"/>
+          </a:p>
+          <a:p>
+            <a:endParaRPr lang="fr-FR" sz="800" b="1" dirty="0"/>
+          </a:p>
+          <a:p>
+            <a:r>
+              <a:rPr lang="fr-FR" sz="800" b="1" dirty="0" smtClean="0">
+                <a:solidFill>
+                  <a:srgbClr val="FF0000"/>
+                </a:solidFill>
+              </a:rPr>
+              <a:t>Patrick: j’ai n’ai pas pris en compte le filtrage</a:t>
+            </a:r>
+            <a:endParaRPr lang="fr-FR" sz="800" dirty="0">
+              <a:solidFill>
+                <a:srgbClr val="FF0000"/>
+              </a:solidFill>
+            </a:endParaRPr>
           </a:p>
         </p:txBody>
       </p:sp>
@@ -4602,7 +4625,7 @@
         <p:spPr>
           <a:xfrm>
             <a:off x="5201177" y="4208091"/>
-            <a:ext cx="2164354" cy="461665"/>
+            <a:ext cx="2164354" cy="1200329"/>
           </a:xfrm>
           <a:prstGeom prst="rect">
             <a:avLst/>
@@ -4667,9 +4690,26 @@
               <a:t> lose 15% </a:t>
             </a:r>
             <a:r>
-              <a:rPr lang="fr-FR" sz="800" i="1" dirty="0" err="1"/>
+              <a:rPr lang="fr-FR" sz="800" i="1" dirty="0" err="1" smtClean="0"/>
               <a:t>productivity</a:t>
             </a:r>
+            <a:endParaRPr lang="fr-FR" sz="800" i="1" dirty="0" smtClean="0"/>
+          </a:p>
+          <a:p>
+            <a:endParaRPr lang="fr-FR" sz="800" i="1" dirty="0"/>
+          </a:p>
+          <a:p>
+            <a:r>
+              <a:rPr lang="fr-FR" sz="800" b="1" dirty="0">
+                <a:solidFill>
+                  <a:srgbClr val="FF0000"/>
+                </a:solidFill>
+              </a:rPr>
+              <a:t>Patrick: un peu comme pour la pollution des sols, j’ai dis ici que plus le canal est pollué, plus les champs autour ont une production diminuée</a:t>
+            </a:r>
+            <a:endParaRPr lang="fr-FR" sz="800" i="1" dirty="0"/>
+          </a:p>
+          <a:p>
             <a:endParaRPr lang="fr-FR" sz="800" i="1" dirty="0"/>
           </a:p>
         </p:txBody>
@@ -5312,7 +5352,7 @@
         <p:spPr>
           <a:xfrm>
             <a:off x="8200593" y="4357027"/>
-            <a:ext cx="1788255" cy="584775"/>
+            <a:ext cx="1788255" cy="1323439"/>
           </a:xfrm>
           <a:prstGeom prst="rect">
             <a:avLst/>
@@ -5435,8 +5475,80 @@
               <a:t> </a:t>
             </a:r>
             <a:r>
-              <a:rPr lang="fr-FR" sz="800" i="1" dirty="0" err="1"/>
+              <a:rPr lang="fr-FR" sz="800" i="1" dirty="0" err="1" smtClean="0"/>
               <a:t>polluted</a:t>
+            </a:r>
+            <a:endParaRPr lang="fr-FR" sz="800" i="1" dirty="0" smtClean="0"/>
+          </a:p>
+          <a:p>
+            <a:pPr algn="r"/>
+            <a:endParaRPr lang="fr-FR" sz="800" i="1" dirty="0"/>
+          </a:p>
+          <a:p>
+            <a:pPr algn="r"/>
+            <a:r>
+              <a:rPr lang="fr-FR" sz="800" b="1" dirty="0">
+                <a:solidFill>
+                  <a:srgbClr val="FF0000"/>
+                </a:solidFill>
+              </a:rPr>
+              <a:t>Patrick: </a:t>
+            </a:r>
+            <a:r>
+              <a:rPr lang="fr-FR" sz="800" b="1" dirty="0" smtClean="0">
+                <a:solidFill>
+                  <a:srgbClr val="FF0000"/>
+                </a:solidFill>
+              </a:rPr>
+              <a:t>un peu compliqué, j’ai fait plus simple: plus il y a de </a:t>
+            </a:r>
+            <a:r>
+              <a:rPr lang="fr-FR" sz="800" b="1" dirty="0" err="1" smtClean="0">
+                <a:solidFill>
+                  <a:srgbClr val="FF0000"/>
+                </a:solidFill>
+              </a:rPr>
+              <a:t>ground</a:t>
+            </a:r>
+            <a:r>
+              <a:rPr lang="fr-FR" sz="800" b="1" dirty="0" smtClean="0">
+                <a:solidFill>
+                  <a:srgbClr val="FF0000"/>
+                </a:solidFill>
+              </a:rPr>
+              <a:t> pollution sur les cellules sur </a:t>
+            </a:r>
+            <a:r>
+              <a:rPr lang="fr-FR" sz="800" b="1" dirty="0" err="1" smtClean="0">
+                <a:solidFill>
+                  <a:srgbClr val="FF0000"/>
+                </a:solidFill>
+              </a:rPr>
+              <a:t>lequelles</a:t>
+            </a:r>
+            <a:r>
+              <a:rPr lang="fr-FR" sz="800" b="1" dirty="0" smtClean="0">
+                <a:solidFill>
+                  <a:srgbClr val="FF0000"/>
+                </a:solidFill>
+              </a:rPr>
+              <a:t> se trouve le </a:t>
+            </a:r>
+            <a:r>
+              <a:rPr lang="fr-FR" sz="800" b="1" dirty="0" err="1" smtClean="0">
+                <a:solidFill>
+                  <a:srgbClr val="FF0000"/>
+                </a:solidFill>
+              </a:rPr>
+              <a:t>field</a:t>
+            </a:r>
+            <a:r>
+              <a:rPr lang="fr-FR" sz="800" b="1" dirty="0" smtClean="0">
+                <a:solidFill>
+                  <a:srgbClr val="FF0000"/>
+                </a:solidFill>
+              </a:rPr>
+              <a:t>, plus cela décrémente la production</a:t>
             </a:r>
             <a:endParaRPr lang="fr-FR" sz="800" i="1" dirty="0"/>
           </a:p>
@@ -5457,7 +5569,7 @@
         <p:spPr>
           <a:xfrm>
             <a:off x="9984298" y="4357235"/>
-            <a:ext cx="1788255" cy="338554"/>
+            <a:ext cx="1788255" cy="1815882"/>
           </a:xfrm>
           <a:prstGeom prst="rect">
             <a:avLst/>
@@ -5496,8 +5608,46 @@
             </a:r>
             <a:r>
               <a:rPr lang="fr-FR" sz="800" i="1" dirty="0"/>
-              <a:t> by 25%</a:t>
-            </a:r>
+              <a:t> by 25</a:t>
+            </a:r>
+            <a:r>
+              <a:rPr lang="fr-FR" sz="800" i="1" dirty="0" smtClean="0"/>
+              <a:t>%</a:t>
+            </a:r>
+          </a:p>
+          <a:p>
+            <a:endParaRPr lang="fr-FR" sz="800" i="1" dirty="0"/>
+          </a:p>
+          <a:p>
+            <a:r>
+              <a:rPr lang="fr-FR" sz="800" b="1" dirty="0">
+                <a:solidFill>
+                  <a:srgbClr val="FF0000"/>
+                </a:solidFill>
+              </a:rPr>
+              <a:t>Patrick: </a:t>
+            </a:r>
+            <a:r>
+              <a:rPr lang="fr-FR" sz="800" b="1" dirty="0" smtClean="0">
+                <a:solidFill>
+                  <a:srgbClr val="FF0000"/>
+                </a:solidFill>
+              </a:rPr>
+              <a:t>pas sur de ce que cela veut dire. Ce que j’ai fait, c’est qu’un champ va avoir un niveau de pollution de l’eau résultant des pratiques qui va affecter le canal le plus proche et les cellules sur lesquelles se trouve le champ</a:t>
+            </a:r>
+            <a:endParaRPr lang="fr-FR" sz="800" i="1" dirty="0" smtClean="0"/>
+          </a:p>
+          <a:p>
+            <a:endParaRPr lang="fr-FR" sz="800" i="1" dirty="0" smtClean="0"/>
+          </a:p>
+          <a:p>
+            <a:endParaRPr lang="fr-FR" sz="800" i="1" dirty="0" smtClean="0"/>
+          </a:p>
+          <a:p>
+            <a:endParaRPr lang="fr-FR" sz="800" i="1" dirty="0"/>
+          </a:p>
+          <a:p>
+            <a:endParaRPr lang="fr-FR" sz="800" i="1" dirty="0"/>
           </a:p>
         </p:txBody>
       </p:sp>

</xml_diff>